<commit_message>
Added router to workout2 and modify Workout2 pptx
</commit_message>
<xml_diff>
--- a/Week_1/Workout2.pptx
+++ b/Week_1/Workout2.pptx
@@ -6,19 +6,20 @@
     <p:sldMasterId id="2147483652" r:id="rId2"/>
   </p:sldMasterIdLst>
   <p:notesMasterIdLst>
-    <p:notesMasterId r:id="rId10"/>
+    <p:notesMasterId r:id="rId11"/>
   </p:notesMasterIdLst>
   <p:handoutMasterIdLst>
-    <p:handoutMasterId r:id="rId11"/>
+    <p:handoutMasterId r:id="rId12"/>
   </p:handoutMasterIdLst>
   <p:sldIdLst>
     <p:sldId id="849" r:id="rId3"/>
     <p:sldId id="888" r:id="rId4"/>
     <p:sldId id="889" r:id="rId5"/>
-    <p:sldId id="891" r:id="rId6"/>
-    <p:sldId id="890" r:id="rId7"/>
-    <p:sldId id="892" r:id="rId8"/>
-    <p:sldId id="893" r:id="rId9"/>
+    <p:sldId id="894" r:id="rId6"/>
+    <p:sldId id="891" r:id="rId7"/>
+    <p:sldId id="890" r:id="rId8"/>
+    <p:sldId id="892" r:id="rId9"/>
+    <p:sldId id="893" r:id="rId10"/>
   </p:sldIdLst>
   <p:sldSz cx="9144000" cy="6858000" type="screen4x3"/>
   <p:notesSz cx="7315200" cy="9601200"/>
@@ -1137,7 +1138,7 @@
                   <a:tab pos="9665969" algn="l"/>
                 </a:tabLst>
               </a:pPr>
-              <a:t>7</a:t>
+              <a:t>8</a:t>
             </a:fld>
             <a:endParaRPr lang="en-GB" sz="1300" dirty="0">
               <a:solidFill>
@@ -1902,7 +1903,7 @@
           <a:graphicData uri="http://schemas.openxmlformats.org/presentationml/2006/ole">
             <mc:AlternateContent xmlns:mc="http://schemas.openxmlformats.org/markup-compatibility/2006">
               <mc:Choice xmlns:v="urn:schemas-microsoft-com:vml" Requires="v">
-                <p:oleObj spid="_x0000_s713739" name="Photo Editor Photo" r:id="rId3" imgW="9142857" imgH="743054" progId="">
+                <p:oleObj spid="_x0000_s713741" name="Photo Editor Photo" r:id="rId3" imgW="9142857" imgH="743054" progId="">
                   <p:embed/>
                 </p:oleObj>
               </mc:Choice>
@@ -3531,7 +3532,7 @@
           <a:graphicData uri="http://schemas.openxmlformats.org/presentationml/2006/ole">
             <mc:AlternateContent xmlns:mc="http://schemas.openxmlformats.org/markup-compatibility/2006">
               <mc:Choice xmlns:v="urn:schemas-microsoft-com:vml" Requires="v">
-                <p:oleObj spid="_x0000_s715787" name="Photo Editor Photo" r:id="rId3" imgW="9142857" imgH="743054" progId="">
+                <p:oleObj spid="_x0000_s715789" name="Photo Editor Photo" r:id="rId3" imgW="9142857" imgH="743054" progId="">
                   <p:embed/>
                 </p:oleObj>
               </mc:Choice>
@@ -8648,7 +8649,7 @@
           <a:graphicData uri="http://schemas.openxmlformats.org/presentationml/2006/ole">
             <mc:AlternateContent xmlns:mc="http://schemas.openxmlformats.org/markup-compatibility/2006">
               <mc:Choice xmlns:v="urn:schemas-microsoft-com:vml" Requires="v">
-                <p:oleObj spid="_x0000_s1035" name="Photo Editor Photo" r:id="rId17" imgW="9142857" imgH="743054" progId="">
+                <p:oleObj spid="_x0000_s1037" name="Photo Editor Photo" r:id="rId17" imgW="9142857" imgH="743054" progId="">
                   <p:embed/>
                 </p:oleObj>
               </mc:Choice>
@@ -13079,7 +13080,7 @@
           <a:graphicData uri="http://schemas.openxmlformats.org/presentationml/2006/ole">
             <mc:AlternateContent xmlns:mc="http://schemas.openxmlformats.org/markup-compatibility/2006">
               <mc:Choice xmlns:v="urn:schemas-microsoft-com:vml" Requires="v">
-                <p:oleObj spid="_x0000_s714799" name="Photo Editor Photo" r:id="rId4" imgW="1467055" imgH="390580" progId="">
+                <p:oleObj spid="_x0000_s714809" name="Photo Editor Photo" r:id="rId4" imgW="1467055" imgH="390580" progId="">
                   <p:embed/>
                 </p:oleObj>
               </mc:Choice>
@@ -13330,7 +13331,7 @@
           <a:graphicData uri="http://schemas.openxmlformats.org/presentationml/2006/ole">
             <mc:AlternateContent xmlns:mc="http://schemas.openxmlformats.org/markup-compatibility/2006">
               <mc:Choice xmlns:v="urn:schemas-microsoft-com:vml" Requires="v">
-                <p:oleObj spid="_x0000_s714800" name="Photo Editor Photo" r:id="rId6" imgW="9142857" imgH="3610479" progId="">
+                <p:oleObj spid="_x0000_s714810" name="Photo Editor Photo" r:id="rId6" imgW="9142857" imgH="3610479" progId="">
                   <p:embed/>
                 </p:oleObj>
               </mc:Choice>
@@ -13423,7 +13424,7 @@
           <a:graphicData uri="http://schemas.openxmlformats.org/presentationml/2006/ole">
             <mc:AlternateContent xmlns:mc="http://schemas.openxmlformats.org/markup-compatibility/2006">
               <mc:Choice xmlns:v="urn:schemas-microsoft-com:vml" Requires="v">
-                <p:oleObj spid="_x0000_s714801" name="Photo Editor Photo" r:id="rId8" imgW="1142857" imgH="914286" progId="">
+                <p:oleObj spid="_x0000_s714811" name="Photo Editor Photo" r:id="rId8" imgW="1142857" imgH="914286" progId="">
                   <p:embed/>
                 </p:oleObj>
               </mc:Choice>
@@ -13516,7 +13517,7 @@
           <a:graphicData uri="http://schemas.openxmlformats.org/presentationml/2006/ole">
             <mc:AlternateContent xmlns:mc="http://schemas.openxmlformats.org/markup-compatibility/2006">
               <mc:Choice xmlns:v="urn:schemas-microsoft-com:vml" Requires="v">
-                <p:oleObj spid="_x0000_s714802" name="Photo Editor Photo" r:id="rId10" imgW="1142857" imgH="914286" progId="">
+                <p:oleObj spid="_x0000_s714812" name="Photo Editor Photo" r:id="rId10" imgW="1142857" imgH="914286" progId="">
                   <p:embed/>
                 </p:oleObj>
               </mc:Choice>
@@ -13609,7 +13610,7 @@
           <a:graphicData uri="http://schemas.openxmlformats.org/presentationml/2006/ole">
             <mc:AlternateContent xmlns:mc="http://schemas.openxmlformats.org/markup-compatibility/2006">
               <mc:Choice xmlns:v="urn:schemas-microsoft-com:vml" Requires="v">
-                <p:oleObj spid="_x0000_s714803" name="Photo Editor Photo" r:id="rId12" imgW="1142857" imgH="914286" progId="">
+                <p:oleObj spid="_x0000_s714813" name="Photo Editor Photo" r:id="rId12" imgW="1142857" imgH="914286" progId="">
                   <p:embed/>
                 </p:oleObj>
               </mc:Choice>
@@ -14011,11 +14012,20 @@
               <a:buChar char="•"/>
             </a:pPr>
             <a:r>
+              <a:rPr lang="en-US" dirty="0">
+                <a:latin typeface="Constantia" panose="02030602050306030303" pitchFamily="18" charset="0"/>
+              </a:rPr>
+              <a:t>Installing </a:t>
+            </a:r>
+            <a:r>
               <a:rPr lang="en-US" dirty="0" smtClean="0">
                 <a:latin typeface="Constantia" panose="02030602050306030303" pitchFamily="18" charset="0"/>
               </a:rPr>
-              <a:t>Understanding Template Engines</a:t>
-            </a:r>
+              <a:t>Libraries</a:t>
+            </a:r>
+            <a:endParaRPr lang="en-US" dirty="0" smtClean="0">
+              <a:latin typeface="Constantia" panose="02030602050306030303" pitchFamily="18" charset="0"/>
+            </a:endParaRPr>
           </a:p>
           <a:p>
             <a:pPr lvl="1">
@@ -14026,7 +14036,13 @@
               <a:rPr lang="en-US" dirty="0" smtClean="0">
                 <a:latin typeface="Constantia" panose="02030602050306030303" pitchFamily="18" charset="0"/>
               </a:rPr>
-              <a:t>Installing Libraries</a:t>
+              <a:t>Understanding </a:t>
+            </a:r>
+            <a:r>
+              <a:rPr lang="en-US" dirty="0" smtClean="0">
+                <a:latin typeface="Constantia" panose="02030602050306030303" pitchFamily="18" charset="0"/>
+              </a:rPr>
+              <a:t>Template Engines</a:t>
             </a:r>
           </a:p>
           <a:p>
@@ -14038,7 +14054,13 @@
               <a:rPr lang="en-US" dirty="0" smtClean="0">
                 <a:latin typeface="Constantia" panose="02030602050306030303" pitchFamily="18" charset="0"/>
               </a:rPr>
-              <a:t>Understanding Routes</a:t>
+              <a:t>Understanding </a:t>
+            </a:r>
+            <a:r>
+              <a:rPr lang="en-US" dirty="0" smtClean="0">
+                <a:latin typeface="Constantia" panose="02030602050306030303" pitchFamily="18" charset="0"/>
+              </a:rPr>
+              <a:t>Routes</a:t>
             </a:r>
           </a:p>
           <a:p>
@@ -14195,7 +14217,7 @@
                   <a:schemeClr val="accent2"/>
                 </a:solidFill>
               </a:rPr>
-              <a:t>Template Engines</a:t>
+              <a:t>Installing Libraries</a:t>
             </a:r>
             <a:endParaRPr lang="en-US" dirty="0" smtClean="0">
               <a:solidFill>
@@ -14209,8 +14231,17 @@
           <a:p>
             <a:r>
               <a:rPr lang="en-US" sz="2000" u="sng" dirty="0" smtClean="0"/>
-              <a:t>What is it?</a:t>
-            </a:r>
+              <a:t>How </a:t>
+            </a:r>
+            <a:r>
+              <a:rPr lang="en-US" sz="2000" u="sng" dirty="0" smtClean="0"/>
+              <a:t>to do it</a:t>
+            </a:r>
+            <a:r>
+              <a:rPr lang="en-US" sz="2000" u="sng" dirty="0" smtClean="0"/>
+              <a:t>?</a:t>
+            </a:r>
+            <a:endParaRPr lang="en-US" sz="2000" u="sng" dirty="0" smtClean="0"/>
           </a:p>
           <a:p>
             <a:pPr marL="0" indent="0"/>
@@ -14220,22 +14251,16 @@
             <a:pPr marL="0" indent="0"/>
             <a:r>
               <a:rPr lang="en-US" dirty="0" smtClean="0"/>
-              <a:t>Express now ask you to setup a default template engine to create your HTML pages. </a:t>
-            </a:r>
-          </a:p>
-          <a:p>
-            <a:pPr marL="0" indent="0"/>
-            <a:endParaRPr lang="en-US" dirty="0"/>
-          </a:p>
-          <a:p>
-            <a:pPr marL="0" indent="0"/>
+              <a:t>You could install any library in </a:t>
+            </a:r>
+            <a:r>
+              <a:rPr lang="en-US" dirty="0" err="1" smtClean="0"/>
+              <a:t>NodeJS</a:t>
+            </a:r>
             <a:r>
               <a:rPr lang="en-US" dirty="0" smtClean="0"/>
-              <a:t>Template engines basically help you to create semantic templates to build your HTML pages.</a:t>
-            </a:r>
-          </a:p>
-          <a:p>
-            <a:pPr marL="0" indent="0"/>
+              <a:t> using NPM to install it, then require the library to use it in your code. </a:t>
+            </a:r>
             <a:endParaRPr lang="en-US" dirty="0" smtClean="0"/>
           </a:p>
           <a:p>
@@ -14272,6 +14297,220 @@
                 <a:defRPr/>
               </a:pPr>
               <a:t>3</a:t>
+            </a:fld>
+            <a:endParaRPr lang="ru-RU" dirty="0"/>
+          </a:p>
+        </p:txBody>
+      </p:sp>
+      <p:pic>
+        <p:nvPicPr>
+          <p:cNvPr id="10" name="Content Placeholder 9"/>
+          <p:cNvPicPr>
+            <a:picLocks noGrp="1" noChangeAspect="1"/>
+          </p:cNvPicPr>
+          <p:nvPr>
+            <p:ph sz="half" idx="2"/>
+          </p:nvPr>
+        </p:nvPicPr>
+        <p:blipFill>
+          <a:blip r:embed="rId2"/>
+          <a:stretch>
+            <a:fillRect/>
+          </a:stretch>
+        </p:blipFill>
+        <p:spPr>
+          <a:xfrm>
+            <a:off x="4889226" y="1042988"/>
+            <a:ext cx="3564485" cy="5135562"/>
+          </a:xfrm>
+          <a:prstGeom prst="rect">
+            <a:avLst/>
+          </a:prstGeom>
+        </p:spPr>
+      </p:pic>
+      <p:pic>
+        <p:nvPicPr>
+          <p:cNvPr id="9" name="Picture 8"/>
+          <p:cNvPicPr>
+            <a:picLocks noChangeAspect="1"/>
+          </p:cNvPicPr>
+          <p:nvPr/>
+        </p:nvPicPr>
+        <p:blipFill>
+          <a:blip r:embed="rId3"/>
+          <a:stretch>
+            <a:fillRect/>
+          </a:stretch>
+        </p:blipFill>
+        <p:spPr>
+          <a:xfrm>
+            <a:off x="598965" y="4006896"/>
+            <a:ext cx="3457575" cy="1400175"/>
+          </a:xfrm>
+          <a:prstGeom prst="rect">
+            <a:avLst/>
+          </a:prstGeom>
+        </p:spPr>
+      </p:pic>
+    </p:spTree>
+    <p:extLst>
+      <p:ext uri="{BB962C8B-B14F-4D97-AF65-F5344CB8AC3E}">
+        <p14:creationId xmlns:p14="http://schemas.microsoft.com/office/powerpoint/2010/main" val="1660757479"/>
+      </p:ext>
+    </p:extLst>
+  </p:cSld>
+  <p:clrMapOvr>
+    <a:masterClrMapping/>
+  </p:clrMapOvr>
+</p:sld>
+</file>
+
+<file path=ppt/slides/slide4.xml><?xml version="1.0" encoding="utf-8"?>
+<p:sld xmlns:a="http://schemas.openxmlformats.org/drawingml/2006/main" xmlns:r="http://schemas.openxmlformats.org/officeDocument/2006/relationships" xmlns:p="http://schemas.openxmlformats.org/presentationml/2006/main">
+  <p:cSld>
+    <p:spTree>
+      <p:nvGrpSpPr>
+        <p:cNvPr id="1" name=""/>
+        <p:cNvGrpSpPr/>
+        <p:nvPr/>
+      </p:nvGrpSpPr>
+      <p:grpSpPr>
+        <a:xfrm>
+          <a:off x="0" y="0"/>
+          <a:ext cx="0" cy="0"/>
+          <a:chOff x="0" y="0"/>
+          <a:chExt cx="0" cy="0"/>
+        </a:xfrm>
+      </p:grpSpPr>
+      <p:sp>
+        <p:nvSpPr>
+          <p:cNvPr id="2" name="Title 1"/>
+          <p:cNvSpPr>
+            <a:spLocks noGrp="1"/>
+          </p:cNvSpPr>
+          <p:nvPr>
+            <p:ph type="title"/>
+          </p:nvPr>
+        </p:nvSpPr>
+        <p:spPr/>
+        <p:txBody>
+          <a:bodyPr/>
+          <a:lstStyle/>
+          <a:p>
+            <a:r>
+              <a:rPr lang="en-US" dirty="0" smtClean="0"/>
+              <a:t>Node.js </a:t>
+            </a:r>
+            <a:r>
+              <a:rPr lang="en-US" dirty="0"/>
+              <a:t>with Bootstrap, Express, React and </a:t>
+            </a:r>
+            <a:r>
+              <a:rPr lang="en-US" dirty="0" err="1"/>
+              <a:t>Redux</a:t>
+            </a:r>
+            <a:endParaRPr lang="en-US" dirty="0"/>
+          </a:p>
+        </p:txBody>
+      </p:sp>
+      <p:sp>
+        <p:nvSpPr>
+          <p:cNvPr id="3" name="Text Placeholder 2"/>
+          <p:cNvSpPr>
+            <a:spLocks noGrp="1"/>
+          </p:cNvSpPr>
+          <p:nvPr>
+            <p:ph type="body" sz="half" idx="1"/>
+          </p:nvPr>
+        </p:nvSpPr>
+        <p:spPr/>
+        <p:txBody>
+          <a:bodyPr/>
+          <a:lstStyle/>
+          <a:p>
+            <a:r>
+              <a:rPr lang="en-US" sz="2400" dirty="0" smtClean="0">
+                <a:solidFill>
+                  <a:schemeClr val="accent2"/>
+                </a:solidFill>
+              </a:rPr>
+              <a:t>Template Engines</a:t>
+            </a:r>
+            <a:endParaRPr lang="en-US" dirty="0" smtClean="0">
+              <a:solidFill>
+                <a:schemeClr val="accent2"/>
+              </a:solidFill>
+            </a:endParaRPr>
+          </a:p>
+          <a:p>
+            <a:endParaRPr lang="en-US" dirty="0"/>
+          </a:p>
+          <a:p>
+            <a:r>
+              <a:rPr lang="en-US" sz="2000" u="sng" dirty="0" smtClean="0"/>
+              <a:t>What is it?</a:t>
+            </a:r>
+          </a:p>
+          <a:p>
+            <a:pPr marL="0" indent="0"/>
+            <a:endParaRPr lang="en-US" dirty="0" smtClean="0"/>
+          </a:p>
+          <a:p>
+            <a:pPr marL="0" indent="0"/>
+            <a:r>
+              <a:rPr lang="en-US" dirty="0" smtClean="0"/>
+              <a:t>Express now ask you to setup a default template engine to create your HTML pages. </a:t>
+            </a:r>
+          </a:p>
+          <a:p>
+            <a:pPr marL="0" indent="0"/>
+            <a:endParaRPr lang="en-US" dirty="0"/>
+          </a:p>
+          <a:p>
+            <a:pPr marL="0" indent="0"/>
+            <a:r>
+              <a:rPr lang="en-US" dirty="0" smtClean="0"/>
+              <a:t>Template engines basically help you to create semantic templates to build your HTML pages.</a:t>
+            </a:r>
+          </a:p>
+          <a:p>
+            <a:pPr marL="0" indent="0"/>
+            <a:endParaRPr lang="en-US" dirty="0" smtClean="0"/>
+          </a:p>
+          <a:p>
+            <a:pPr marL="0" indent="0"/>
+            <a:endParaRPr lang="en-US" dirty="0"/>
+          </a:p>
+          <a:p>
+            <a:pPr marL="0" indent="0"/>
+            <a:endParaRPr lang="en-US" dirty="0"/>
+          </a:p>
+        </p:txBody>
+      </p:sp>
+      <p:sp>
+        <p:nvSpPr>
+          <p:cNvPr id="5" name="Slide Number Placeholder 4"/>
+          <p:cNvSpPr>
+            <a:spLocks noGrp="1"/>
+          </p:cNvSpPr>
+          <p:nvPr>
+            <p:ph type="sldNum" sz="quarter" idx="10"/>
+          </p:nvPr>
+        </p:nvSpPr>
+        <p:spPr/>
+        <p:txBody>
+          <a:bodyPr/>
+          <a:lstStyle/>
+          <a:p>
+            <a:pPr>
+              <a:defRPr/>
+            </a:pPr>
+            <a:fld id="{436DB259-355B-4D80-90B3-F50BCB352002}" type="slidenum">
+              <a:rPr lang="ru-RU" smtClean="0"/>
+              <a:pPr>
+                <a:defRPr/>
+              </a:pPr>
+              <a:t>4</a:t>
             </a:fld>
             <a:endParaRPr lang="ru-RU" dirty="0"/>
           </a:p>
@@ -14330,7 +14569,7 @@
     </p:spTree>
     <p:extLst>
       <p:ext uri="{BB962C8B-B14F-4D97-AF65-F5344CB8AC3E}">
-        <p14:creationId xmlns:p14="http://schemas.microsoft.com/office/powerpoint/2010/main" val="1660757479"/>
+        <p14:creationId xmlns:p14="http://schemas.microsoft.com/office/powerpoint/2010/main" val="3868059473"/>
       </p:ext>
     </p:extLst>
   </p:cSld>
@@ -14340,7 +14579,7 @@
 </p:sld>
 </file>
 
-<file path=ppt/slides/slide4.xml><?xml version="1.0" encoding="utf-8"?>
+<file path=ppt/slides/slide5.xml><?xml version="1.0" encoding="utf-8"?>
 <p:sld xmlns:a="http://schemas.openxmlformats.org/drawingml/2006/main" xmlns:r="http://schemas.openxmlformats.org/officeDocument/2006/relationships" xmlns:p="http://schemas.openxmlformats.org/presentationml/2006/main">
   <p:cSld>
     <p:spTree>
@@ -14564,7 +14803,7 @@
               <a:pPr>
                 <a:defRPr/>
               </a:pPr>
-              <a:t>4</a:t>
+              <a:t>5</a:t>
             </a:fld>
             <a:endParaRPr lang="ru-RU" dirty="0"/>
           </a:p>
@@ -14609,7 +14848,7 @@
 </p:sld>
 </file>
 
-<file path=ppt/slides/slide5.xml><?xml version="1.0" encoding="utf-8"?>
+<file path=ppt/slides/slide6.xml><?xml version="1.0" encoding="utf-8"?>
 <p:sld xmlns:a="http://schemas.openxmlformats.org/drawingml/2006/main" xmlns:r="http://schemas.openxmlformats.org/officeDocument/2006/relationships" xmlns:p="http://schemas.openxmlformats.org/presentationml/2006/main">
   <p:cSld>
     <p:spTree>
@@ -14762,7 +15001,7 @@
               <a:pPr>
                 <a:defRPr/>
               </a:pPr>
-              <a:t>5</a:t>
+              <a:t>6</a:t>
             </a:fld>
             <a:endParaRPr lang="ru-RU" dirty="0"/>
           </a:p>
@@ -14824,7 +15063,7 @@
 </p:sld>
 </file>
 
-<file path=ppt/slides/slide6.xml><?xml version="1.0" encoding="utf-8"?>
+<file path=ppt/slides/slide7.xml><?xml version="1.0" encoding="utf-8"?>
 <p:sld xmlns:a="http://schemas.openxmlformats.org/drawingml/2006/main" xmlns:r="http://schemas.openxmlformats.org/officeDocument/2006/relationships" xmlns:p="http://schemas.openxmlformats.org/presentationml/2006/main">
   <p:cSld>
     <p:spTree>
@@ -15039,7 +15278,7 @@
               <a:pPr>
                 <a:defRPr/>
               </a:pPr>
-              <a:t>6</a:t>
+              <a:t>7</a:t>
             </a:fld>
             <a:endParaRPr lang="ru-RU" dirty="0"/>
           </a:p>
@@ -15058,7 +15297,7 @@
 </p:sld>
 </file>
 
-<file path=ppt/slides/slide7.xml><?xml version="1.0" encoding="utf-8"?>
+<file path=ppt/slides/slide8.xml><?xml version="1.0" encoding="utf-8"?>
 <p:sld xmlns:a="http://schemas.openxmlformats.org/drawingml/2006/main" xmlns:r="http://schemas.openxmlformats.org/officeDocument/2006/relationships" xmlns:p="http://schemas.openxmlformats.org/presentationml/2006/main">
   <p:cSld>
     <p:spTree>
@@ -15091,7 +15330,7 @@
           <a:graphicData uri="http://schemas.openxmlformats.org/presentationml/2006/ole">
             <mc:AlternateContent xmlns:mc="http://schemas.openxmlformats.org/markup-compatibility/2006">
               <mc:Choice xmlns:v="urn:schemas-microsoft-com:vml" Requires="v">
-                <p:oleObj spid="_x0000_s716802" r:id="rId4" imgW="9142857" imgH="3610479" progId="">
+                <p:oleObj spid="_x0000_s716812" r:id="rId4" imgW="9142857" imgH="3610479" progId="">
                   <p:embed/>
                 </p:oleObj>
               </mc:Choice>
@@ -15165,7 +15404,7 @@
           <a:graphicData uri="http://schemas.openxmlformats.org/presentationml/2006/ole">
             <mc:AlternateContent xmlns:mc="http://schemas.openxmlformats.org/markup-compatibility/2006">
               <mc:Choice xmlns:v="urn:schemas-microsoft-com:vml" Requires="v">
-                <p:oleObj spid="_x0000_s716803" r:id="rId6" imgW="1467055" imgH="390580" progId="">
+                <p:oleObj spid="_x0000_s716813" r:id="rId6" imgW="1467055" imgH="390580" progId="">
                   <p:embed/>
                 </p:oleObj>
               </mc:Choice>
@@ -15441,7 +15680,7 @@
           <a:graphicData uri="http://schemas.openxmlformats.org/presentationml/2006/ole">
             <mc:AlternateContent xmlns:mc="http://schemas.openxmlformats.org/markup-compatibility/2006">
               <mc:Choice xmlns:v="urn:schemas-microsoft-com:vml" Requires="v">
-                <p:oleObj spid="_x0000_s716804" r:id="rId8" imgW="866896" imgH="704948" progId="">
+                <p:oleObj spid="_x0000_s716814" r:id="rId8" imgW="866896" imgH="704948" progId="">
                   <p:embed/>
                 </p:oleObj>
               </mc:Choice>
@@ -15515,7 +15754,7 @@
           <a:graphicData uri="http://schemas.openxmlformats.org/presentationml/2006/ole">
             <mc:AlternateContent xmlns:mc="http://schemas.openxmlformats.org/markup-compatibility/2006">
               <mc:Choice xmlns:v="urn:schemas-microsoft-com:vml" Requires="v">
-                <p:oleObj spid="_x0000_s716805" r:id="rId10" imgW="866896" imgH="704948" progId="">
+                <p:oleObj spid="_x0000_s716815" r:id="rId10" imgW="866896" imgH="704948" progId="">
                   <p:embed/>
                 </p:oleObj>
               </mc:Choice>
@@ -15589,7 +15828,7 @@
           <a:graphicData uri="http://schemas.openxmlformats.org/presentationml/2006/ole">
             <mc:AlternateContent xmlns:mc="http://schemas.openxmlformats.org/markup-compatibility/2006">
               <mc:Choice xmlns:v="urn:schemas-microsoft-com:vml" Requires="v">
-                <p:oleObj spid="_x0000_s716806" r:id="rId12" imgW="866896" imgH="704948" progId="">
+                <p:oleObj spid="_x0000_s716816" r:id="rId12" imgW="866896" imgH="704948" progId="">
                   <p:embed/>
                 </p:oleObj>
               </mc:Choice>

</xml_diff>